<commit_message>
Week 3 Micro Project Update
</commit_message>
<xml_diff>
--- a/FisherJ_ANA500_Micro-Project_template.pptx
+++ b/FisherJ_ANA500_Micro-Project_template.pptx
@@ -14,9 +14,14 @@
     <p:sldId id="267" r:id="rId8"/>
     <p:sldId id="268" r:id="rId9"/>
     <p:sldId id="269" r:id="rId10"/>
-    <p:sldId id="262" r:id="rId11"/>
-    <p:sldId id="263" r:id="rId12"/>
-    <p:sldId id="265" r:id="rId13"/>
+    <p:sldId id="271" r:id="rId11"/>
+    <p:sldId id="273" r:id="rId12"/>
+    <p:sldId id="262" r:id="rId13"/>
+    <p:sldId id="274" r:id="rId14"/>
+    <p:sldId id="275" r:id="rId15"/>
+    <p:sldId id="263" r:id="rId16"/>
+    <p:sldId id="276" r:id="rId17"/>
+    <p:sldId id="265" r:id="rId18"/>
   </p:sldIdLst>
   <p:sldSz cx="12192000" cy="6858000"/>
   <p:notesSz cx="6858000" cy="9144000"/>
@@ -270,7 +275,7 @@
           <a:p>
             <a:fld id="{3F52AFC1-4F45-459D-BC95-0F8F5E3A4294}" type="datetimeFigureOut">
               <a:rPr lang="en-US" smtClean="0"/>
-              <a:t>5/19/2024</a:t>
+              <a:t>5/26/2024</a:t>
             </a:fld>
             <a:endParaRPr lang="en-US"/>
           </a:p>
@@ -468,7 +473,7 @@
           <a:p>
             <a:fld id="{3F52AFC1-4F45-459D-BC95-0F8F5E3A4294}" type="datetimeFigureOut">
               <a:rPr lang="en-US" smtClean="0"/>
-              <a:t>5/19/2024</a:t>
+              <a:t>5/26/2024</a:t>
             </a:fld>
             <a:endParaRPr lang="en-US"/>
           </a:p>
@@ -676,7 +681,7 @@
           <a:p>
             <a:fld id="{3F52AFC1-4F45-459D-BC95-0F8F5E3A4294}" type="datetimeFigureOut">
               <a:rPr lang="en-US" smtClean="0"/>
-              <a:t>5/19/2024</a:t>
+              <a:t>5/26/2024</a:t>
             </a:fld>
             <a:endParaRPr lang="en-US"/>
           </a:p>
@@ -874,7 +879,7 @@
           <a:p>
             <a:fld id="{3F52AFC1-4F45-459D-BC95-0F8F5E3A4294}" type="datetimeFigureOut">
               <a:rPr lang="en-US" smtClean="0"/>
-              <a:t>5/19/2024</a:t>
+              <a:t>5/26/2024</a:t>
             </a:fld>
             <a:endParaRPr lang="en-US"/>
           </a:p>
@@ -1149,7 +1154,7 @@
           <a:p>
             <a:fld id="{3F52AFC1-4F45-459D-BC95-0F8F5E3A4294}" type="datetimeFigureOut">
               <a:rPr lang="en-US" smtClean="0"/>
-              <a:t>5/19/2024</a:t>
+              <a:t>5/26/2024</a:t>
             </a:fld>
             <a:endParaRPr lang="en-US"/>
           </a:p>
@@ -1414,7 +1419,7 @@
           <a:p>
             <a:fld id="{3F52AFC1-4F45-459D-BC95-0F8F5E3A4294}" type="datetimeFigureOut">
               <a:rPr lang="en-US" smtClean="0"/>
-              <a:t>5/19/2024</a:t>
+              <a:t>5/26/2024</a:t>
             </a:fld>
             <a:endParaRPr lang="en-US"/>
           </a:p>
@@ -1826,7 +1831,7 @@
           <a:p>
             <a:fld id="{3F52AFC1-4F45-459D-BC95-0F8F5E3A4294}" type="datetimeFigureOut">
               <a:rPr lang="en-US" smtClean="0"/>
-              <a:t>5/19/2024</a:t>
+              <a:t>5/26/2024</a:t>
             </a:fld>
             <a:endParaRPr lang="en-US"/>
           </a:p>
@@ -1967,7 +1972,7 @@
           <a:p>
             <a:fld id="{3F52AFC1-4F45-459D-BC95-0F8F5E3A4294}" type="datetimeFigureOut">
               <a:rPr lang="en-US" smtClean="0"/>
-              <a:t>5/19/2024</a:t>
+              <a:t>5/26/2024</a:t>
             </a:fld>
             <a:endParaRPr lang="en-US"/>
           </a:p>
@@ -2080,7 +2085,7 @@
           <a:p>
             <a:fld id="{3F52AFC1-4F45-459D-BC95-0F8F5E3A4294}" type="datetimeFigureOut">
               <a:rPr lang="en-US" smtClean="0"/>
-              <a:t>5/19/2024</a:t>
+              <a:t>5/26/2024</a:t>
             </a:fld>
             <a:endParaRPr lang="en-US"/>
           </a:p>
@@ -2391,7 +2396,7 @@
           <a:p>
             <a:fld id="{3F52AFC1-4F45-459D-BC95-0F8F5E3A4294}" type="datetimeFigureOut">
               <a:rPr lang="en-US" smtClean="0"/>
-              <a:t>5/19/2024</a:t>
+              <a:t>5/26/2024</a:t>
             </a:fld>
             <a:endParaRPr lang="en-US"/>
           </a:p>
@@ -2679,7 +2684,7 @@
           <a:p>
             <a:fld id="{3F52AFC1-4F45-459D-BC95-0F8F5E3A4294}" type="datetimeFigureOut">
               <a:rPr lang="en-US" smtClean="0"/>
-              <a:t>5/19/2024</a:t>
+              <a:t>5/26/2024</a:t>
             </a:fld>
             <a:endParaRPr lang="en-US"/>
           </a:p>
@@ -2920,7 +2925,7 @@
           <a:p>
             <a:fld id="{3F52AFC1-4F45-459D-BC95-0F8F5E3A4294}" type="datetimeFigureOut">
               <a:rPr lang="en-US" smtClean="0"/>
-              <a:t>5/19/2024</a:t>
+              <a:t>5/26/2024</a:t>
             </a:fld>
             <a:endParaRPr lang="en-US"/>
           </a:p>
@@ -3369,7 +3374,7 @@
             </a:br>
             <a:r>
               <a:rPr lang="en-US" sz="4800" dirty="0"/>
-              <a:t>Micro-Project 2</a:t>
+              <a:t>Micro-Project 3</a:t>
             </a:r>
             <a:br>
               <a:rPr lang="en-US" sz="4800" dirty="0"/>
@@ -3418,9 +3423,10 @@
           </a:p>
           <a:p>
             <a:r>
-              <a:rPr lang="en-US" dirty="0"/>
-              <a:t>5-19-2024</a:t>
-            </a:r>
+              <a:rPr lang="en-US"/>
+              <a:t>5-26-2024</a:t>
+            </a:r>
+            <a:endParaRPr lang="en-US" dirty="0"/>
           </a:p>
           <a:p>
             <a:endParaRPr lang="en-US" dirty="0"/>
@@ -3473,49 +3479,190 @@
             <p:ph type="title"/>
           </p:nvPr>
         </p:nvSpPr>
-        <p:spPr/>
-        <p:txBody>
-          <a:bodyPr/>
-          <a:lstStyle/>
-          <a:p>
-            <a:r>
-              <a:rPr lang="en-US" dirty="0"/>
-              <a:t>Report</a:t>
-            </a:r>
-          </a:p>
-        </p:txBody>
-      </p:sp>
-      <p:sp>
-        <p:nvSpPr>
-          <p:cNvPr id="3" name="Content Placeholder 2">
-            <a:extLst>
-              <a:ext uri="{FF2B5EF4-FFF2-40B4-BE49-F238E27FC236}">
-                <a16:creationId xmlns:a16="http://schemas.microsoft.com/office/drawing/2014/main" id="{7FEAE391-6366-4E20-A14E-0ECFAEA8029A}"/>
-              </a:ext>
-            </a:extLst>
-          </p:cNvPr>
-          <p:cNvSpPr>
-            <a:spLocks noGrp="1"/>
-          </p:cNvSpPr>
-          <p:nvPr>
-            <p:ph idx="1"/>
-          </p:nvPr>
-        </p:nvSpPr>
-        <p:spPr/>
-        <p:txBody>
-          <a:bodyPr/>
-          <a:lstStyle/>
-          <a:p>
-            <a:r>
-              <a:rPr lang="en-US" sz="1800" dirty="0">
+        <p:spPr>
+          <a:xfrm>
+            <a:off x="838199" y="365126"/>
+            <a:ext cx="10882533" cy="1534926"/>
+          </a:xfrm>
+        </p:spPr>
+        <p:txBody>
+          <a:bodyPr>
+            <a:normAutofit/>
+          </a:bodyPr>
+          <a:lstStyle/>
+          <a:p>
+            <a:r>
+              <a:rPr lang="en-US" sz="3600" b="1" dirty="0"/>
+              <a:t>Model Approach &amp; Outputs</a:t>
+            </a:r>
+          </a:p>
+        </p:txBody>
+      </p:sp>
+      <p:sp>
+        <p:nvSpPr>
+          <p:cNvPr id="3" name="TextBox 2">
+            <a:extLst>
+              <a:ext uri="{FF2B5EF4-FFF2-40B4-BE49-F238E27FC236}">
+                <a16:creationId xmlns:a16="http://schemas.microsoft.com/office/drawing/2014/main" id="{A75BBD05-44FB-75A6-BB5A-6D760ADBC392}"/>
+              </a:ext>
+            </a:extLst>
+          </p:cNvPr>
+          <p:cNvSpPr txBox="1"/>
+          <p:nvPr/>
+        </p:nvSpPr>
+        <p:spPr>
+          <a:xfrm>
+            <a:off x="838198" y="1743386"/>
+            <a:ext cx="10277106" cy="4062651"/>
+          </a:xfrm>
+          <a:prstGeom prst="rect">
+            <a:avLst/>
+          </a:prstGeom>
+          <a:noFill/>
+        </p:spPr>
+        <p:txBody>
+          <a:bodyPr wrap="square" rtlCol="0">
+            <a:spAutoFit/>
+          </a:bodyPr>
+          <a:lstStyle/>
+          <a:p>
+            <a:pPr marL="342900" indent="-342900">
+              <a:spcAft>
+                <a:spcPts val="1200"/>
+              </a:spcAft>
+              <a:buFont typeface="Arial" panose="020B0604020202020204" pitchFamily="34" charset="0"/>
+              <a:buChar char="•"/>
+            </a:pPr>
+            <a:r>
+              <a:rPr lang="en-US" sz="2000" dirty="0"/>
+              <a:t>All models will attempt to predict worsening memory problems and/or confusion</a:t>
+            </a:r>
+          </a:p>
+          <a:p>
+            <a:pPr marL="342900" indent="-342900">
+              <a:spcAft>
+                <a:spcPts val="1200"/>
+              </a:spcAft>
+              <a:buFont typeface="Arial" panose="020B0604020202020204" pitchFamily="34" charset="0"/>
+              <a:buChar char="•"/>
+            </a:pPr>
+            <a:r>
+              <a:rPr lang="en-US" sz="2000" dirty="0"/>
+              <a:t>ACE variables only available for a limited number of respondent records</a:t>
+            </a:r>
+            <a:endParaRPr lang="en-US" sz="800" dirty="0"/>
+          </a:p>
+          <a:p>
+            <a:pPr>
+              <a:spcAft>
+                <a:spcPts val="1200"/>
+              </a:spcAft>
+            </a:pPr>
+            <a:endParaRPr lang="en-US" sz="800" dirty="0"/>
+          </a:p>
+          <a:p>
+            <a:pPr marL="342900" indent="-342900">
+              <a:spcAft>
+                <a:spcPts val="1200"/>
+              </a:spcAft>
+              <a:buFont typeface="Arial" panose="020B0604020202020204" pitchFamily="34" charset="0"/>
+              <a:buChar char="•"/>
+            </a:pPr>
+            <a:r>
+              <a:rPr lang="en-US" sz="2000" b="1" dirty="0">
                 <a:solidFill>
-                  <a:srgbClr val="000000"/>
+                  <a:schemeClr val="accent1">
+                    <a:lumMod val="50000"/>
+                  </a:schemeClr>
                 </a:solidFill>
-                <a:effectLst/>
-                <a:latin typeface="Times New Roman" panose="02020603050405020304" pitchFamily="18" charset="0"/>
-                <a:ea typeface="Times New Roman" panose="02020603050405020304" pitchFamily="18" charset="0"/>
-              </a:rPr>
-              <a:t>[To update with models derived from Micro Project 3]</a:t>
+              </a:rPr>
+              <a:t>COHORT 1</a:t>
+            </a:r>
+            <a:r>
+              <a:rPr lang="en-US" sz="2000" dirty="0"/>
+              <a:t> (n = 64,675) will consider all predictors except adverse childhood experiences (ACE)</a:t>
+            </a:r>
+          </a:p>
+          <a:p>
+            <a:pPr marL="342900" indent="-342900">
+              <a:spcAft>
+                <a:spcPts val="1200"/>
+              </a:spcAft>
+              <a:buFont typeface="Arial" panose="020B0604020202020204" pitchFamily="34" charset="0"/>
+              <a:buChar char="•"/>
+            </a:pPr>
+            <a:r>
+              <a:rPr lang="en-US" sz="2000" b="1" dirty="0">
+                <a:solidFill>
+                  <a:schemeClr val="accent1">
+                    <a:lumMod val="50000"/>
+                  </a:schemeClr>
+                </a:solidFill>
+              </a:rPr>
+              <a:t>COHORT 2</a:t>
+            </a:r>
+            <a:r>
+              <a:rPr lang="en-US" sz="2000" dirty="0"/>
+              <a:t> (n = 18,793) adds in these ACE variables to the model and considers only the 18,793 respondent records for which all predictors, including ACE data, are available.</a:t>
+            </a:r>
+          </a:p>
+          <a:p>
+            <a:pPr>
+              <a:spcAft>
+                <a:spcPts val="1200"/>
+              </a:spcAft>
+            </a:pPr>
+            <a:endParaRPr lang="en-US" sz="600" dirty="0"/>
+          </a:p>
+          <a:p>
+            <a:pPr marL="342900" indent="-342900">
+              <a:spcAft>
+                <a:spcPts val="1200"/>
+              </a:spcAft>
+              <a:buFont typeface="Arial" panose="020B0604020202020204" pitchFamily="34" charset="0"/>
+              <a:buChar char="•"/>
+            </a:pPr>
+            <a:r>
+              <a:rPr lang="en-US" sz="2400" dirty="0"/>
+              <a:t>Included machine learning models:</a:t>
+            </a:r>
+          </a:p>
+          <a:p>
+            <a:pPr marL="800100" lvl="1" indent="-342900">
+              <a:spcAft>
+                <a:spcPts val="1200"/>
+              </a:spcAft>
+              <a:buFont typeface="Arial" panose="020B0604020202020204" pitchFamily="34" charset="0"/>
+              <a:buChar char="•"/>
+            </a:pPr>
+            <a:r>
+              <a:rPr lang="en-US" sz="2000" dirty="0">
+                <a:solidFill>
+                  <a:schemeClr val="accent1">
+                    <a:lumMod val="50000"/>
+                  </a:schemeClr>
+                </a:solidFill>
+              </a:rPr>
+              <a:t>Multiple Logistic Regression</a:t>
+            </a:r>
+          </a:p>
+          <a:p>
+            <a:pPr marL="800100" lvl="1" indent="-342900">
+              <a:spcAft>
+                <a:spcPts val="1200"/>
+              </a:spcAft>
+              <a:buFont typeface="Arial" panose="020B0604020202020204" pitchFamily="34" charset="0"/>
+              <a:buChar char="•"/>
+            </a:pPr>
+            <a:r>
+              <a:rPr lang="en-US" sz="2000" dirty="0">
+                <a:solidFill>
+                  <a:schemeClr val="accent1">
+                    <a:lumMod val="50000"/>
+                  </a:schemeClr>
+                </a:solidFill>
+              </a:rPr>
+              <a:t>Support Vector Machine (SVM)</a:t>
             </a:r>
           </a:p>
         </p:txBody>
@@ -3523,7 +3670,7 @@
     </p:spTree>
     <p:extLst>
       <p:ext uri="{BB962C8B-B14F-4D97-AF65-F5344CB8AC3E}">
-        <p14:creationId xmlns:p14="http://schemas.microsoft.com/office/powerpoint/2010/main" val="2309908418"/>
+        <p14:creationId xmlns:p14="http://schemas.microsoft.com/office/powerpoint/2010/main" val="993037828"/>
       </p:ext>
     </p:extLst>
   </p:cSld>
@@ -3555,6 +3702,956 @@
           <p:cNvPr id="2" name="Title 1">
             <a:extLst>
               <a:ext uri="{FF2B5EF4-FFF2-40B4-BE49-F238E27FC236}">
+                <a16:creationId xmlns:a16="http://schemas.microsoft.com/office/drawing/2014/main" id="{DB2A7252-6823-44F9-B464-D7A15D12BB65}"/>
+              </a:ext>
+            </a:extLst>
+          </p:cNvPr>
+          <p:cNvSpPr>
+            <a:spLocks noGrp="1"/>
+          </p:cNvSpPr>
+          <p:nvPr>
+            <p:ph type="title"/>
+          </p:nvPr>
+        </p:nvSpPr>
+        <p:spPr>
+          <a:xfrm>
+            <a:off x="838199" y="365126"/>
+            <a:ext cx="10882533" cy="1534926"/>
+          </a:xfrm>
+        </p:spPr>
+        <p:txBody>
+          <a:bodyPr>
+            <a:normAutofit/>
+          </a:bodyPr>
+          <a:lstStyle/>
+          <a:p>
+            <a:r>
+              <a:rPr lang="en-US" sz="3600" dirty="0"/>
+              <a:t>Cohort 1: Multiple Logistic Regression (MLR) Model</a:t>
+            </a:r>
+            <a:br>
+              <a:rPr lang="en-US" sz="3600" dirty="0"/>
+            </a:br>
+            <a:r>
+              <a:rPr lang="en-US" sz="3600" dirty="0"/>
+              <a:t>		</a:t>
+            </a:r>
+            <a:r>
+              <a:rPr lang="en-US" sz="2800" dirty="0"/>
+              <a:t>(</a:t>
+            </a:r>
+            <a:r>
+              <a:rPr lang="en-US" sz="2800" i="1" dirty="0"/>
+              <a:t>excluding ACE variables</a:t>
+            </a:r>
+            <a:r>
+              <a:rPr lang="en-US" sz="2800" dirty="0"/>
+              <a:t>, n = 64,675)</a:t>
+            </a:r>
+            <a:endParaRPr lang="en-US" sz="3600" dirty="0"/>
+          </a:p>
+        </p:txBody>
+      </p:sp>
+      <p:pic>
+        <p:nvPicPr>
+          <p:cNvPr id="9" name="Picture 8">
+            <a:extLst>
+              <a:ext uri="{FF2B5EF4-FFF2-40B4-BE49-F238E27FC236}">
+                <a16:creationId xmlns:a16="http://schemas.microsoft.com/office/drawing/2014/main" id="{204FEB74-3CDC-DBCE-3300-44B91F121510}"/>
+              </a:ext>
+            </a:extLst>
+          </p:cNvPr>
+          <p:cNvPicPr>
+            <a:picLocks noChangeAspect="1"/>
+          </p:cNvPicPr>
+          <p:nvPr/>
+        </p:nvPicPr>
+        <p:blipFill>
+          <a:blip r:embed="rId2"/>
+          <a:stretch>
+            <a:fillRect/>
+          </a:stretch>
+        </p:blipFill>
+        <p:spPr>
+          <a:xfrm>
+            <a:off x="471268" y="1699198"/>
+            <a:ext cx="3919114" cy="3258751"/>
+          </a:xfrm>
+          <a:prstGeom prst="rect">
+            <a:avLst/>
+          </a:prstGeom>
+        </p:spPr>
+      </p:pic>
+      <p:sp>
+        <p:nvSpPr>
+          <p:cNvPr id="10" name="TextBox 9">
+            <a:extLst>
+              <a:ext uri="{FF2B5EF4-FFF2-40B4-BE49-F238E27FC236}">
+                <a16:creationId xmlns:a16="http://schemas.microsoft.com/office/drawing/2014/main" id="{50678332-4E17-1DAF-7618-64A8A08FAD0B}"/>
+              </a:ext>
+            </a:extLst>
+          </p:cNvPr>
+          <p:cNvSpPr txBox="1"/>
+          <p:nvPr/>
+        </p:nvSpPr>
+        <p:spPr>
+          <a:xfrm>
+            <a:off x="5070550" y="2051913"/>
+            <a:ext cx="6650182" cy="2708434"/>
+          </a:xfrm>
+          <a:prstGeom prst="rect">
+            <a:avLst/>
+          </a:prstGeom>
+          <a:noFill/>
+        </p:spPr>
+        <p:txBody>
+          <a:bodyPr wrap="square" rtlCol="0">
+            <a:spAutoFit/>
+          </a:bodyPr>
+          <a:lstStyle/>
+          <a:p>
+            <a:pPr marL="285750" indent="-285750">
+              <a:spcAft>
+                <a:spcPts val="1200"/>
+              </a:spcAft>
+              <a:buFont typeface="Arial" panose="020B0604020202020204" pitchFamily="34" charset="0"/>
+              <a:buChar char="•"/>
+            </a:pPr>
+            <a:r>
+              <a:rPr lang="en-US" sz="2000" dirty="0"/>
+              <a:t>Our MLR model accurately predicts about 74% of cases</a:t>
+            </a:r>
+          </a:p>
+          <a:p>
+            <a:pPr marL="285750" indent="-285750">
+              <a:spcAft>
+                <a:spcPts val="1200"/>
+              </a:spcAft>
+              <a:buFont typeface="Arial" panose="020B0604020202020204" pitchFamily="34" charset="0"/>
+              <a:buChar char="•"/>
+            </a:pPr>
+            <a:r>
+              <a:rPr lang="en-US" sz="2000" dirty="0"/>
+              <a:t>The model predicts the majority class (0; no worsening memory problems and/or confusion) with 94% precision</a:t>
+            </a:r>
+          </a:p>
+          <a:p>
+            <a:pPr marL="285750" indent="-285750">
+              <a:spcAft>
+                <a:spcPts val="1200"/>
+              </a:spcAft>
+              <a:buFont typeface="Arial" panose="020B0604020202020204" pitchFamily="34" charset="0"/>
+              <a:buChar char="•"/>
+            </a:pPr>
+            <a:r>
+              <a:rPr lang="en-US" sz="2000" dirty="0"/>
+              <a:t>Precision for the minority class (1; presence of worsening memory problems and/or confusion) is only 24%</a:t>
+            </a:r>
+          </a:p>
+          <a:p>
+            <a:pPr marL="285750" indent="-285750">
+              <a:spcAft>
+                <a:spcPts val="1200"/>
+              </a:spcAft>
+              <a:buFont typeface="Arial" panose="020B0604020202020204" pitchFamily="34" charset="0"/>
+              <a:buChar char="•"/>
+            </a:pPr>
+            <a:r>
+              <a:rPr lang="en-US" sz="2000" dirty="0"/>
+              <a:t>Low performance predicting presence of confusion and/or memory problems suggests need for model improvement</a:t>
+            </a:r>
+          </a:p>
+        </p:txBody>
+      </p:sp>
+      <p:pic>
+        <p:nvPicPr>
+          <p:cNvPr id="4" name="Picture 3">
+            <a:extLst>
+              <a:ext uri="{FF2B5EF4-FFF2-40B4-BE49-F238E27FC236}">
+                <a16:creationId xmlns:a16="http://schemas.microsoft.com/office/drawing/2014/main" id="{9D75679D-4922-3EB5-ADD2-565EC5F3D2AD}"/>
+              </a:ext>
+            </a:extLst>
+          </p:cNvPr>
+          <p:cNvPicPr>
+            <a:picLocks noChangeAspect="1"/>
+          </p:cNvPicPr>
+          <p:nvPr/>
+        </p:nvPicPr>
+        <p:blipFill>
+          <a:blip r:embed="rId3"/>
+          <a:stretch>
+            <a:fillRect/>
+          </a:stretch>
+        </p:blipFill>
+        <p:spPr>
+          <a:xfrm>
+            <a:off x="162765" y="5477977"/>
+            <a:ext cx="4134427" cy="962159"/>
+          </a:xfrm>
+          <a:prstGeom prst="rect">
+            <a:avLst/>
+          </a:prstGeom>
+        </p:spPr>
+      </p:pic>
+    </p:spTree>
+    <p:extLst>
+      <p:ext uri="{BB962C8B-B14F-4D97-AF65-F5344CB8AC3E}">
+        <p14:creationId xmlns:p14="http://schemas.microsoft.com/office/powerpoint/2010/main" val="2529077242"/>
+      </p:ext>
+    </p:extLst>
+  </p:cSld>
+  <p:clrMapOvr>
+    <a:masterClrMapping/>
+  </p:clrMapOvr>
+</p:sld>
+</file>
+
+<file path=ppt/slides/slide12.xml><?xml version="1.0" encoding="utf-8"?>
+<p:sld xmlns:a="http://schemas.openxmlformats.org/drawingml/2006/main" xmlns:r="http://schemas.openxmlformats.org/officeDocument/2006/relationships" xmlns:p="http://schemas.openxmlformats.org/presentationml/2006/main">
+  <p:cSld>
+    <p:spTree>
+      <p:nvGrpSpPr>
+        <p:cNvPr id="1" name=""/>
+        <p:cNvGrpSpPr/>
+        <p:nvPr/>
+      </p:nvGrpSpPr>
+      <p:grpSpPr>
+        <a:xfrm>
+          <a:off x="0" y="0"/>
+          <a:ext cx="0" cy="0"/>
+          <a:chOff x="0" y="0"/>
+          <a:chExt cx="0" cy="0"/>
+        </a:xfrm>
+      </p:grpSpPr>
+      <p:sp>
+        <p:nvSpPr>
+          <p:cNvPr id="2" name="Title 1">
+            <a:extLst>
+              <a:ext uri="{FF2B5EF4-FFF2-40B4-BE49-F238E27FC236}">
+                <a16:creationId xmlns:a16="http://schemas.microsoft.com/office/drawing/2014/main" id="{DB2A7252-6823-44F9-B464-D7A15D12BB65}"/>
+              </a:ext>
+            </a:extLst>
+          </p:cNvPr>
+          <p:cNvSpPr>
+            <a:spLocks noGrp="1"/>
+          </p:cNvSpPr>
+          <p:nvPr>
+            <p:ph type="title"/>
+          </p:nvPr>
+        </p:nvSpPr>
+        <p:spPr>
+          <a:xfrm>
+            <a:off x="838199" y="365126"/>
+            <a:ext cx="10882533" cy="1534926"/>
+          </a:xfrm>
+        </p:spPr>
+        <p:txBody>
+          <a:bodyPr>
+            <a:normAutofit/>
+          </a:bodyPr>
+          <a:lstStyle/>
+          <a:p>
+            <a:r>
+              <a:rPr lang="en-US" sz="3600" dirty="0"/>
+              <a:t>Cohort 2: Multiple Logistic Regression (MLR) Model</a:t>
+            </a:r>
+            <a:br>
+              <a:rPr lang="en-US" sz="3600" dirty="0"/>
+            </a:br>
+            <a:r>
+              <a:rPr lang="en-US" sz="3600" dirty="0"/>
+              <a:t>		</a:t>
+            </a:r>
+            <a:r>
+              <a:rPr lang="en-US" sz="2800" dirty="0"/>
+              <a:t>(</a:t>
+            </a:r>
+            <a:r>
+              <a:rPr lang="en-US" sz="2800" i="1" dirty="0"/>
+              <a:t>including ACE variables</a:t>
+            </a:r>
+            <a:r>
+              <a:rPr lang="en-US" sz="2800" dirty="0"/>
+              <a:t>, n = 18,793)</a:t>
+            </a:r>
+            <a:endParaRPr lang="en-US" sz="3600" dirty="0"/>
+          </a:p>
+        </p:txBody>
+      </p:sp>
+      <p:sp>
+        <p:nvSpPr>
+          <p:cNvPr id="10" name="TextBox 9">
+            <a:extLst>
+              <a:ext uri="{FF2B5EF4-FFF2-40B4-BE49-F238E27FC236}">
+                <a16:creationId xmlns:a16="http://schemas.microsoft.com/office/drawing/2014/main" id="{50678332-4E17-1DAF-7618-64A8A08FAD0B}"/>
+              </a:ext>
+            </a:extLst>
+          </p:cNvPr>
+          <p:cNvSpPr txBox="1"/>
+          <p:nvPr/>
+        </p:nvSpPr>
+        <p:spPr>
+          <a:xfrm>
+            <a:off x="5070550" y="1937480"/>
+            <a:ext cx="6650182" cy="3323987"/>
+          </a:xfrm>
+          <a:prstGeom prst="rect">
+            <a:avLst/>
+          </a:prstGeom>
+          <a:noFill/>
+        </p:spPr>
+        <p:txBody>
+          <a:bodyPr wrap="square" rtlCol="0">
+            <a:spAutoFit/>
+          </a:bodyPr>
+          <a:lstStyle/>
+          <a:p>
+            <a:pPr marL="285750" indent="-285750">
+              <a:spcAft>
+                <a:spcPts val="1200"/>
+              </a:spcAft>
+              <a:buFont typeface="Arial" panose="020B0604020202020204" pitchFamily="34" charset="0"/>
+              <a:buChar char="•"/>
+            </a:pPr>
+            <a:r>
+              <a:rPr lang="en-US" sz="2000" dirty="0"/>
+              <a:t>Addition of ACE variables and application to smaller dataset did not materially change model performance</a:t>
+            </a:r>
+          </a:p>
+          <a:p>
+            <a:pPr marL="285750" indent="-285750">
+              <a:spcAft>
+                <a:spcPts val="1200"/>
+              </a:spcAft>
+              <a:buFont typeface="Arial" panose="020B0604020202020204" pitchFamily="34" charset="0"/>
+              <a:buChar char="•"/>
+            </a:pPr>
+            <a:r>
+              <a:rPr lang="en-US" sz="2000" dirty="0"/>
+              <a:t>Cohort 2 accuracy was ~73%</a:t>
+            </a:r>
+          </a:p>
+          <a:p>
+            <a:pPr marL="285750" indent="-285750">
+              <a:spcAft>
+                <a:spcPts val="1200"/>
+              </a:spcAft>
+              <a:buFont typeface="Arial" panose="020B0604020202020204" pitchFamily="34" charset="0"/>
+              <a:buChar char="•"/>
+            </a:pPr>
+            <a:r>
+              <a:rPr lang="en-US" sz="2000" dirty="0"/>
+              <a:t>Identical precision (94%) and recall (75%) for negative class</a:t>
+            </a:r>
+          </a:p>
+          <a:p>
+            <a:pPr marL="285750" indent="-285750">
+              <a:spcAft>
+                <a:spcPts val="1200"/>
+              </a:spcAft>
+              <a:buFont typeface="Arial" panose="020B0604020202020204" pitchFamily="34" charset="0"/>
+              <a:buChar char="•"/>
+            </a:pPr>
+            <a:r>
+              <a:rPr lang="en-US" sz="2000" dirty="0"/>
+              <a:t>Slightly higher precision (25%) compared to Cohort 1 (24%)</a:t>
+            </a:r>
+          </a:p>
+          <a:p>
+            <a:pPr marL="285750" indent="-285750">
+              <a:spcAft>
+                <a:spcPts val="1200"/>
+              </a:spcAft>
+              <a:buFont typeface="Arial" panose="020B0604020202020204" pitchFamily="34" charset="0"/>
+              <a:buChar char="•"/>
+            </a:pPr>
+            <a:r>
+              <a:rPr lang="en-US" sz="2000" dirty="0"/>
+              <a:t>Slightly lower recall (62%) compared to Cohort 1 (63%)</a:t>
+            </a:r>
+          </a:p>
+          <a:p>
+            <a:pPr marL="285750" indent="-285750">
+              <a:spcAft>
+                <a:spcPts val="1200"/>
+              </a:spcAft>
+              <a:buFont typeface="Arial" panose="020B0604020202020204" pitchFamily="34" charset="0"/>
+              <a:buChar char="•"/>
+            </a:pPr>
+            <a:r>
+              <a:rPr lang="en-US" sz="2000" dirty="0"/>
+              <a:t>Performance &lt; 75% predicting confusion and/or memory problems suggests need for model improvement</a:t>
+            </a:r>
+          </a:p>
+        </p:txBody>
+      </p:sp>
+      <p:pic>
+        <p:nvPicPr>
+          <p:cNvPr id="12" name="Picture 11">
+            <a:extLst>
+              <a:ext uri="{FF2B5EF4-FFF2-40B4-BE49-F238E27FC236}">
+                <a16:creationId xmlns:a16="http://schemas.microsoft.com/office/drawing/2014/main" id="{9360FF50-B048-8A18-F8E8-73C3DC80B553}"/>
+              </a:ext>
+            </a:extLst>
+          </p:cNvPr>
+          <p:cNvPicPr>
+            <a:picLocks noChangeAspect="1"/>
+          </p:cNvPicPr>
+          <p:nvPr/>
+        </p:nvPicPr>
+        <p:blipFill>
+          <a:blip r:embed="rId2"/>
+          <a:stretch>
+            <a:fillRect/>
+          </a:stretch>
+        </p:blipFill>
+        <p:spPr>
+          <a:xfrm>
+            <a:off x="423768" y="1728374"/>
+            <a:ext cx="3986921" cy="3258751"/>
+          </a:xfrm>
+          <a:prstGeom prst="rect">
+            <a:avLst/>
+          </a:prstGeom>
+        </p:spPr>
+      </p:pic>
+      <p:pic>
+        <p:nvPicPr>
+          <p:cNvPr id="14" name="Picture 13">
+            <a:extLst>
+              <a:ext uri="{FF2B5EF4-FFF2-40B4-BE49-F238E27FC236}">
+                <a16:creationId xmlns:a16="http://schemas.microsoft.com/office/drawing/2014/main" id="{15FD87BC-494D-16FF-FB06-1835ACDD1982}"/>
+              </a:ext>
+            </a:extLst>
+          </p:cNvPr>
+          <p:cNvPicPr>
+            <a:picLocks noChangeAspect="1"/>
+          </p:cNvPicPr>
+          <p:nvPr/>
+        </p:nvPicPr>
+        <p:blipFill>
+          <a:blip r:embed="rId3"/>
+          <a:stretch>
+            <a:fillRect/>
+          </a:stretch>
+        </p:blipFill>
+        <p:spPr>
+          <a:xfrm>
+            <a:off x="289755" y="5506965"/>
+            <a:ext cx="3986921" cy="921505"/>
+          </a:xfrm>
+          <a:prstGeom prst="rect">
+            <a:avLst/>
+          </a:prstGeom>
+        </p:spPr>
+      </p:pic>
+    </p:spTree>
+    <p:extLst>
+      <p:ext uri="{BB962C8B-B14F-4D97-AF65-F5344CB8AC3E}">
+        <p14:creationId xmlns:p14="http://schemas.microsoft.com/office/powerpoint/2010/main" val="2309908418"/>
+      </p:ext>
+    </p:extLst>
+  </p:cSld>
+  <p:clrMapOvr>
+    <a:masterClrMapping/>
+  </p:clrMapOvr>
+</p:sld>
+</file>
+
+<file path=ppt/slides/slide13.xml><?xml version="1.0" encoding="utf-8"?>
+<p:sld xmlns:a="http://schemas.openxmlformats.org/drawingml/2006/main" xmlns:r="http://schemas.openxmlformats.org/officeDocument/2006/relationships" xmlns:p="http://schemas.openxmlformats.org/presentationml/2006/main">
+  <p:cSld>
+    <p:spTree>
+      <p:nvGrpSpPr>
+        <p:cNvPr id="1" name=""/>
+        <p:cNvGrpSpPr/>
+        <p:nvPr/>
+      </p:nvGrpSpPr>
+      <p:grpSpPr>
+        <a:xfrm>
+          <a:off x="0" y="0"/>
+          <a:ext cx="0" cy="0"/>
+          <a:chOff x="0" y="0"/>
+          <a:chExt cx="0" cy="0"/>
+        </a:xfrm>
+      </p:grpSpPr>
+      <p:sp>
+        <p:nvSpPr>
+          <p:cNvPr id="2" name="Title 1">
+            <a:extLst>
+              <a:ext uri="{FF2B5EF4-FFF2-40B4-BE49-F238E27FC236}">
+                <a16:creationId xmlns:a16="http://schemas.microsoft.com/office/drawing/2014/main" id="{DB2A7252-6823-44F9-B464-D7A15D12BB65}"/>
+              </a:ext>
+            </a:extLst>
+          </p:cNvPr>
+          <p:cNvSpPr>
+            <a:spLocks noGrp="1"/>
+          </p:cNvSpPr>
+          <p:nvPr>
+            <p:ph type="title"/>
+          </p:nvPr>
+        </p:nvSpPr>
+        <p:spPr>
+          <a:xfrm>
+            <a:off x="838199" y="365126"/>
+            <a:ext cx="10882533" cy="1534926"/>
+          </a:xfrm>
+        </p:spPr>
+        <p:txBody>
+          <a:bodyPr>
+            <a:normAutofit/>
+          </a:bodyPr>
+          <a:lstStyle/>
+          <a:p>
+            <a:r>
+              <a:rPr lang="en-US" sz="3600" dirty="0"/>
+              <a:t>Cohort 1: Support Vector Machine (SVM) Model</a:t>
+            </a:r>
+            <a:br>
+              <a:rPr lang="en-US" sz="3600" dirty="0"/>
+            </a:br>
+            <a:r>
+              <a:rPr lang="en-US" sz="3600" dirty="0"/>
+              <a:t>		</a:t>
+            </a:r>
+            <a:r>
+              <a:rPr lang="en-US" sz="2800" dirty="0"/>
+              <a:t>(</a:t>
+            </a:r>
+            <a:r>
+              <a:rPr lang="en-US" sz="2800" i="1" dirty="0"/>
+              <a:t>excluding ACE variables</a:t>
+            </a:r>
+            <a:r>
+              <a:rPr lang="en-US" sz="2800" dirty="0"/>
+              <a:t>, n = 64,675)</a:t>
+            </a:r>
+            <a:endParaRPr lang="en-US" sz="3600" dirty="0"/>
+          </a:p>
+        </p:txBody>
+      </p:sp>
+      <p:sp>
+        <p:nvSpPr>
+          <p:cNvPr id="10" name="TextBox 9">
+            <a:extLst>
+              <a:ext uri="{FF2B5EF4-FFF2-40B4-BE49-F238E27FC236}">
+                <a16:creationId xmlns:a16="http://schemas.microsoft.com/office/drawing/2014/main" id="{50678332-4E17-1DAF-7618-64A8A08FAD0B}"/>
+              </a:ext>
+            </a:extLst>
+          </p:cNvPr>
+          <p:cNvSpPr txBox="1"/>
+          <p:nvPr/>
+        </p:nvSpPr>
+        <p:spPr>
+          <a:xfrm>
+            <a:off x="5070550" y="1970816"/>
+            <a:ext cx="6650182" cy="3170099"/>
+          </a:xfrm>
+          <a:prstGeom prst="rect">
+            <a:avLst/>
+          </a:prstGeom>
+          <a:noFill/>
+        </p:spPr>
+        <p:txBody>
+          <a:bodyPr wrap="square" rtlCol="0">
+            <a:spAutoFit/>
+          </a:bodyPr>
+          <a:lstStyle/>
+          <a:p>
+            <a:pPr marL="285750" indent="-285750">
+              <a:spcAft>
+                <a:spcPts val="1200"/>
+              </a:spcAft>
+              <a:buFont typeface="Arial" panose="020B0604020202020204" pitchFamily="34" charset="0"/>
+              <a:buChar char="•"/>
+            </a:pPr>
+            <a:r>
+              <a:rPr lang="en-US" sz="2000" dirty="0"/>
+              <a:t>SVM model accurately predicts about 76% of cases</a:t>
+            </a:r>
+          </a:p>
+          <a:p>
+            <a:pPr marL="742950" lvl="1" indent="-285750">
+              <a:spcAft>
+                <a:spcPts val="1200"/>
+              </a:spcAft>
+              <a:buFont typeface="Arial" panose="020B0604020202020204" pitchFamily="34" charset="0"/>
+              <a:buChar char="•"/>
+            </a:pPr>
+            <a:r>
+              <a:rPr lang="en-US" sz="2000" dirty="0"/>
+              <a:t>~2% better than Logistic Regression</a:t>
+            </a:r>
+          </a:p>
+          <a:p>
+            <a:pPr marL="285750" indent="-285750">
+              <a:spcAft>
+                <a:spcPts val="1200"/>
+              </a:spcAft>
+              <a:buFont typeface="Arial" panose="020B0604020202020204" pitchFamily="34" charset="0"/>
+              <a:buChar char="•"/>
+            </a:pPr>
+            <a:r>
+              <a:rPr lang="en-US" sz="2000" dirty="0"/>
+              <a:t>The model predicts the majority class (0; no worsening memory problems and/or confusion) with same precision as MLR (94%) </a:t>
+            </a:r>
+          </a:p>
+          <a:p>
+            <a:pPr marL="285750" indent="-285750">
+              <a:spcAft>
+                <a:spcPts val="1200"/>
+              </a:spcAft>
+              <a:buFont typeface="Arial" panose="020B0604020202020204" pitchFamily="34" charset="0"/>
+              <a:buChar char="•"/>
+            </a:pPr>
+            <a:r>
+              <a:rPr lang="en-US" sz="2000" dirty="0"/>
+              <a:t>Precision for the minority class (1; presence of worsening memory problems and/or confusion) is only 25%</a:t>
+            </a:r>
+          </a:p>
+          <a:p>
+            <a:pPr marL="742950" lvl="1" indent="-285750">
+              <a:spcAft>
+                <a:spcPts val="1200"/>
+              </a:spcAft>
+              <a:buFont typeface="Arial" panose="020B0604020202020204" pitchFamily="34" charset="0"/>
+              <a:buChar char="•"/>
+            </a:pPr>
+            <a:r>
+              <a:rPr lang="en-US" sz="2000" dirty="0"/>
+              <a:t>~1% better precision than MLR</a:t>
+            </a:r>
+          </a:p>
+        </p:txBody>
+      </p:sp>
+      <p:pic>
+        <p:nvPicPr>
+          <p:cNvPr id="6" name="Picture 5">
+            <a:extLst>
+              <a:ext uri="{FF2B5EF4-FFF2-40B4-BE49-F238E27FC236}">
+                <a16:creationId xmlns:a16="http://schemas.microsoft.com/office/drawing/2014/main" id="{FCD158B6-2820-E9AD-11F0-C9F20E9A2489}"/>
+              </a:ext>
+            </a:extLst>
+          </p:cNvPr>
+          <p:cNvPicPr>
+            <a:picLocks noChangeAspect="1"/>
+          </p:cNvPicPr>
+          <p:nvPr/>
+        </p:nvPicPr>
+        <p:blipFill>
+          <a:blip r:embed="rId2"/>
+          <a:stretch>
+            <a:fillRect/>
+          </a:stretch>
+        </p:blipFill>
+        <p:spPr>
+          <a:xfrm>
+            <a:off x="459392" y="1747574"/>
+            <a:ext cx="3922601" cy="3250772"/>
+          </a:xfrm>
+          <a:prstGeom prst="rect">
+            <a:avLst/>
+          </a:prstGeom>
+        </p:spPr>
+      </p:pic>
+      <p:pic>
+        <p:nvPicPr>
+          <p:cNvPr id="8" name="Picture 7">
+            <a:extLst>
+              <a:ext uri="{FF2B5EF4-FFF2-40B4-BE49-F238E27FC236}">
+                <a16:creationId xmlns:a16="http://schemas.microsoft.com/office/drawing/2014/main" id="{8DAC2EF4-77F8-3A2F-DDF3-3063670EB0BE}"/>
+              </a:ext>
+            </a:extLst>
+          </p:cNvPr>
+          <p:cNvPicPr>
+            <a:picLocks noChangeAspect="1"/>
+          </p:cNvPicPr>
+          <p:nvPr/>
+        </p:nvPicPr>
+        <p:blipFill>
+          <a:blip r:embed="rId3"/>
+          <a:stretch>
+            <a:fillRect/>
+          </a:stretch>
+        </p:blipFill>
+        <p:spPr>
+          <a:xfrm>
+            <a:off x="235821" y="5474527"/>
+            <a:ext cx="4015543" cy="936024"/>
+          </a:xfrm>
+          <a:prstGeom prst="rect">
+            <a:avLst/>
+          </a:prstGeom>
+        </p:spPr>
+      </p:pic>
+    </p:spTree>
+    <p:extLst>
+      <p:ext uri="{BB962C8B-B14F-4D97-AF65-F5344CB8AC3E}">
+        <p14:creationId xmlns:p14="http://schemas.microsoft.com/office/powerpoint/2010/main" val="3161472129"/>
+      </p:ext>
+    </p:extLst>
+  </p:cSld>
+  <p:clrMapOvr>
+    <a:masterClrMapping/>
+  </p:clrMapOvr>
+</p:sld>
+</file>
+
+<file path=ppt/slides/slide14.xml><?xml version="1.0" encoding="utf-8"?>
+<p:sld xmlns:a="http://schemas.openxmlformats.org/drawingml/2006/main" xmlns:r="http://schemas.openxmlformats.org/officeDocument/2006/relationships" xmlns:p="http://schemas.openxmlformats.org/presentationml/2006/main">
+  <p:cSld>
+    <p:spTree>
+      <p:nvGrpSpPr>
+        <p:cNvPr id="1" name=""/>
+        <p:cNvGrpSpPr/>
+        <p:nvPr/>
+      </p:nvGrpSpPr>
+      <p:grpSpPr>
+        <a:xfrm>
+          <a:off x="0" y="0"/>
+          <a:ext cx="0" cy="0"/>
+          <a:chOff x="0" y="0"/>
+          <a:chExt cx="0" cy="0"/>
+        </a:xfrm>
+      </p:grpSpPr>
+      <p:sp>
+        <p:nvSpPr>
+          <p:cNvPr id="2" name="Title 1">
+            <a:extLst>
+              <a:ext uri="{FF2B5EF4-FFF2-40B4-BE49-F238E27FC236}">
+                <a16:creationId xmlns:a16="http://schemas.microsoft.com/office/drawing/2014/main" id="{DB2A7252-6823-44F9-B464-D7A15D12BB65}"/>
+              </a:ext>
+            </a:extLst>
+          </p:cNvPr>
+          <p:cNvSpPr>
+            <a:spLocks noGrp="1"/>
+          </p:cNvSpPr>
+          <p:nvPr>
+            <p:ph type="title"/>
+          </p:nvPr>
+        </p:nvSpPr>
+        <p:spPr>
+          <a:xfrm>
+            <a:off x="838199" y="365126"/>
+            <a:ext cx="10882533" cy="1534926"/>
+          </a:xfrm>
+        </p:spPr>
+        <p:txBody>
+          <a:bodyPr>
+            <a:normAutofit/>
+          </a:bodyPr>
+          <a:lstStyle/>
+          <a:p>
+            <a:r>
+              <a:rPr lang="en-US" sz="3600" dirty="0"/>
+              <a:t>Cohort 2: Support Vector Machine (SVM) Model</a:t>
+            </a:r>
+            <a:br>
+              <a:rPr lang="en-US" sz="3600" dirty="0"/>
+            </a:br>
+            <a:r>
+              <a:rPr lang="en-US" sz="3600" dirty="0"/>
+              <a:t>		</a:t>
+            </a:r>
+            <a:r>
+              <a:rPr lang="en-US" sz="2800" dirty="0"/>
+              <a:t>(</a:t>
+            </a:r>
+            <a:r>
+              <a:rPr lang="en-US" sz="2800" i="1" dirty="0"/>
+              <a:t>including ACE variables</a:t>
+            </a:r>
+            <a:r>
+              <a:rPr lang="en-US" sz="2800" dirty="0"/>
+              <a:t>, n = 18,793)</a:t>
+            </a:r>
+            <a:endParaRPr lang="en-US" sz="3600" dirty="0"/>
+          </a:p>
+        </p:txBody>
+      </p:sp>
+      <p:sp>
+        <p:nvSpPr>
+          <p:cNvPr id="10" name="TextBox 9">
+            <a:extLst>
+              <a:ext uri="{FF2B5EF4-FFF2-40B4-BE49-F238E27FC236}">
+                <a16:creationId xmlns:a16="http://schemas.microsoft.com/office/drawing/2014/main" id="{50678332-4E17-1DAF-7618-64A8A08FAD0B}"/>
+              </a:ext>
+            </a:extLst>
+          </p:cNvPr>
+          <p:cNvSpPr txBox="1"/>
+          <p:nvPr/>
+        </p:nvSpPr>
+        <p:spPr>
+          <a:xfrm>
+            <a:off x="5070549" y="1984981"/>
+            <a:ext cx="7018532" cy="2708434"/>
+          </a:xfrm>
+          <a:prstGeom prst="rect">
+            <a:avLst/>
+          </a:prstGeom>
+          <a:noFill/>
+        </p:spPr>
+        <p:txBody>
+          <a:bodyPr wrap="square" rtlCol="0">
+            <a:spAutoFit/>
+          </a:bodyPr>
+          <a:lstStyle/>
+          <a:p>
+            <a:pPr marL="285750" indent="-285750">
+              <a:spcAft>
+                <a:spcPts val="1200"/>
+              </a:spcAft>
+              <a:buFont typeface="Arial" panose="020B0604020202020204" pitchFamily="34" charset="0"/>
+              <a:buChar char="•"/>
+            </a:pPr>
+            <a:r>
+              <a:rPr lang="en-US" sz="2000" dirty="0"/>
+              <a:t>SVM accuracy for Cohort 2 predictions about 2% higher than MLR model (75% vs 73%)</a:t>
+            </a:r>
+          </a:p>
+          <a:p>
+            <a:pPr marL="285750" indent="-285750">
+              <a:spcAft>
+                <a:spcPts val="1200"/>
+              </a:spcAft>
+              <a:buFont typeface="Arial" panose="020B0604020202020204" pitchFamily="34" charset="0"/>
+              <a:buChar char="•"/>
+            </a:pPr>
+            <a:r>
+              <a:rPr lang="en-US" sz="2000" dirty="0"/>
+              <a:t>Addition of ACE variables decreased model accuracy by ~1%</a:t>
+            </a:r>
+          </a:p>
+          <a:p>
+            <a:pPr marL="285750" indent="-285750">
+              <a:spcAft>
+                <a:spcPts val="1200"/>
+              </a:spcAft>
+              <a:buFont typeface="Arial" panose="020B0604020202020204" pitchFamily="34" charset="0"/>
+              <a:buChar char="•"/>
+            </a:pPr>
+            <a:r>
+              <a:rPr lang="en-US" sz="2000" dirty="0"/>
+              <a:t>SVM had slightly higher recall for negative class (77% vs 75%) and slightly lower for positive class (60% vs 62%).</a:t>
+            </a:r>
+          </a:p>
+          <a:p>
+            <a:pPr marL="285750" indent="-285750">
+              <a:spcAft>
+                <a:spcPts val="1200"/>
+              </a:spcAft>
+              <a:buFont typeface="Arial" panose="020B0604020202020204" pitchFamily="34" charset="0"/>
+              <a:buChar char="•"/>
+            </a:pPr>
+            <a:r>
+              <a:rPr lang="en-US" sz="2000" dirty="0"/>
+              <a:t>SVM had slightly lower precision for both negative class </a:t>
+            </a:r>
+            <a:br>
+              <a:rPr lang="en-US" sz="2000" dirty="0"/>
+            </a:br>
+            <a:r>
+              <a:rPr lang="en-US" sz="2000" dirty="0"/>
+              <a:t>(93% vs 94%) and approximately equal for positive class (25%)</a:t>
+            </a:r>
+          </a:p>
+        </p:txBody>
+      </p:sp>
+      <p:pic>
+        <p:nvPicPr>
+          <p:cNvPr id="4" name="Picture 3">
+            <a:extLst>
+              <a:ext uri="{FF2B5EF4-FFF2-40B4-BE49-F238E27FC236}">
+                <a16:creationId xmlns:a16="http://schemas.microsoft.com/office/drawing/2014/main" id="{3742BE8B-A391-A668-442E-028630CB5E06}"/>
+              </a:ext>
+            </a:extLst>
+          </p:cNvPr>
+          <p:cNvPicPr>
+            <a:picLocks noChangeAspect="1"/>
+          </p:cNvPicPr>
+          <p:nvPr/>
+        </p:nvPicPr>
+        <p:blipFill>
+          <a:blip r:embed="rId2"/>
+          <a:stretch>
+            <a:fillRect/>
+          </a:stretch>
+        </p:blipFill>
+        <p:spPr>
+          <a:xfrm>
+            <a:off x="604148" y="1803416"/>
+            <a:ext cx="3789722" cy="3154533"/>
+          </a:xfrm>
+          <a:prstGeom prst="rect">
+            <a:avLst/>
+          </a:prstGeom>
+        </p:spPr>
+      </p:pic>
+      <p:pic>
+        <p:nvPicPr>
+          <p:cNvPr id="11" name="Picture 10">
+            <a:extLst>
+              <a:ext uri="{FF2B5EF4-FFF2-40B4-BE49-F238E27FC236}">
+                <a16:creationId xmlns:a16="http://schemas.microsoft.com/office/drawing/2014/main" id="{D6F461D8-7D96-999C-A6D5-AE37A0DAC2B9}"/>
+              </a:ext>
+            </a:extLst>
+          </p:cNvPr>
+          <p:cNvPicPr>
+            <a:picLocks noChangeAspect="1"/>
+          </p:cNvPicPr>
+          <p:nvPr/>
+        </p:nvPicPr>
+        <p:blipFill>
+          <a:blip r:embed="rId3"/>
+          <a:stretch>
+            <a:fillRect/>
+          </a:stretch>
+        </p:blipFill>
+        <p:spPr>
+          <a:xfrm>
+            <a:off x="568524" y="5486400"/>
+            <a:ext cx="3614192" cy="933589"/>
+          </a:xfrm>
+          <a:prstGeom prst="rect">
+            <a:avLst/>
+          </a:prstGeom>
+        </p:spPr>
+      </p:pic>
+    </p:spTree>
+    <p:extLst>
+      <p:ext uri="{BB962C8B-B14F-4D97-AF65-F5344CB8AC3E}">
+        <p14:creationId xmlns:p14="http://schemas.microsoft.com/office/powerpoint/2010/main" val="2837955497"/>
+      </p:ext>
+    </p:extLst>
+  </p:cSld>
+  <p:clrMapOvr>
+    <a:masterClrMapping/>
+  </p:clrMapOvr>
+</p:sld>
+</file>
+
+<file path=ppt/slides/slide15.xml><?xml version="1.0" encoding="utf-8"?>
+<p:sld xmlns:a="http://schemas.openxmlformats.org/drawingml/2006/main" xmlns:r="http://schemas.openxmlformats.org/officeDocument/2006/relationships" xmlns:p="http://schemas.openxmlformats.org/presentationml/2006/main">
+  <p:cSld>
+    <p:spTree>
+      <p:nvGrpSpPr>
+        <p:cNvPr id="1" name=""/>
+        <p:cNvGrpSpPr/>
+        <p:nvPr/>
+      </p:nvGrpSpPr>
+      <p:grpSpPr>
+        <a:xfrm>
+          <a:off x="0" y="0"/>
+          <a:ext cx="0" cy="0"/>
+          <a:chOff x="0" y="0"/>
+          <a:chExt cx="0" cy="0"/>
+        </a:xfrm>
+      </p:grpSpPr>
+      <p:sp>
+        <p:nvSpPr>
+          <p:cNvPr id="2" name="Title 1">
+            <a:extLst>
+              <a:ext uri="{FF2B5EF4-FFF2-40B4-BE49-F238E27FC236}">
                 <a16:creationId xmlns:a16="http://schemas.microsoft.com/office/drawing/2014/main" id="{7998C1A2-E365-4EAD-A777-10EF9BD2588C}"/>
               </a:ext>
             </a:extLst>
@@ -3573,7 +4670,7 @@
           <a:p>
             <a:r>
               <a:rPr lang="en-US" dirty="0"/>
-              <a:t>Act</a:t>
+              <a:t>Report: Next Steps</a:t>
             </a:r>
           </a:p>
         </p:txBody>
@@ -3608,9 +4705,40 @@
                 <a:latin typeface="Times New Roman" panose="02020603050405020304" pitchFamily="18" charset="0"/>
                 <a:ea typeface="Times New Roman" panose="02020603050405020304" pitchFamily="18" charset="0"/>
               </a:rPr>
-              <a:t>&lt;apply results, connect results with the chosen problem statement or business question&gt;</a:t>
-            </a:r>
-            <a:endParaRPr lang="en-US" dirty="0"/>
+              <a:t>Additional machine learning models will be considered in </a:t>
+            </a:r>
+            <a:r>
+              <a:rPr lang="en-US" sz="1800" u="sng" dirty="0">
+                <a:solidFill>
+                  <a:srgbClr val="000000"/>
+                </a:solidFill>
+                <a:effectLst/>
+                <a:latin typeface="Times New Roman" panose="02020603050405020304" pitchFamily="18" charset="0"/>
+                <a:ea typeface="Times New Roman" panose="02020603050405020304" pitchFamily="18" charset="0"/>
+              </a:rPr>
+              <a:t>Micro Project #4</a:t>
+            </a:r>
+          </a:p>
+          <a:p>
+            <a:r>
+              <a:rPr lang="en-US" sz="1800" dirty="0">
+                <a:solidFill>
+                  <a:srgbClr val="000000"/>
+                </a:solidFill>
+                <a:latin typeface="Times New Roman" panose="02020603050405020304" pitchFamily="18" charset="0"/>
+              </a:rPr>
+              <a:t>Comparison between models and final model selection will be provided in </a:t>
+            </a:r>
+            <a:r>
+              <a:rPr lang="en-US" sz="1800" u="sng" dirty="0">
+                <a:solidFill>
+                  <a:srgbClr val="000000"/>
+                </a:solidFill>
+                <a:latin typeface="Times New Roman" panose="02020603050405020304" pitchFamily="18" charset="0"/>
+              </a:rPr>
+              <a:t>Micro Project #4</a:t>
+            </a:r>
+            <a:endParaRPr lang="en-US" u="sng" dirty="0"/>
           </a:p>
         </p:txBody>
       </p:sp>
@@ -3627,7 +4755,101 @@
 </p:sld>
 </file>
 
-<file path=ppt/slides/slide12.xml><?xml version="1.0" encoding="utf-8"?>
+<file path=ppt/slides/slide16.xml><?xml version="1.0" encoding="utf-8"?>
+<p:sld xmlns:a="http://schemas.openxmlformats.org/drawingml/2006/main" xmlns:r="http://schemas.openxmlformats.org/officeDocument/2006/relationships" xmlns:p="http://schemas.openxmlformats.org/presentationml/2006/main">
+  <p:cSld>
+    <p:spTree>
+      <p:nvGrpSpPr>
+        <p:cNvPr id="1" name=""/>
+        <p:cNvGrpSpPr/>
+        <p:nvPr/>
+      </p:nvGrpSpPr>
+      <p:grpSpPr>
+        <a:xfrm>
+          <a:off x="0" y="0"/>
+          <a:ext cx="0" cy="0"/>
+          <a:chOff x="0" y="0"/>
+          <a:chExt cx="0" cy="0"/>
+        </a:xfrm>
+      </p:grpSpPr>
+      <p:sp>
+        <p:nvSpPr>
+          <p:cNvPr id="2" name="Title 1">
+            <a:extLst>
+              <a:ext uri="{FF2B5EF4-FFF2-40B4-BE49-F238E27FC236}">
+                <a16:creationId xmlns:a16="http://schemas.microsoft.com/office/drawing/2014/main" id="{7998C1A2-E365-4EAD-A777-10EF9BD2588C}"/>
+              </a:ext>
+            </a:extLst>
+          </p:cNvPr>
+          <p:cNvSpPr>
+            <a:spLocks noGrp="1"/>
+          </p:cNvSpPr>
+          <p:nvPr>
+            <p:ph type="title"/>
+          </p:nvPr>
+        </p:nvSpPr>
+        <p:spPr/>
+        <p:txBody>
+          <a:bodyPr/>
+          <a:lstStyle/>
+          <a:p>
+            <a:r>
+              <a:rPr lang="en-US" dirty="0"/>
+              <a:t>Act</a:t>
+            </a:r>
+          </a:p>
+        </p:txBody>
+      </p:sp>
+      <p:sp>
+        <p:nvSpPr>
+          <p:cNvPr id="3" name="Content Placeholder 2">
+            <a:extLst>
+              <a:ext uri="{FF2B5EF4-FFF2-40B4-BE49-F238E27FC236}">
+                <a16:creationId xmlns:a16="http://schemas.microsoft.com/office/drawing/2014/main" id="{83DC0D0A-FDCC-4561-A8EB-1F836A94AACC}"/>
+              </a:ext>
+            </a:extLst>
+          </p:cNvPr>
+          <p:cNvSpPr>
+            <a:spLocks noGrp="1"/>
+          </p:cNvSpPr>
+          <p:nvPr>
+            <p:ph idx="1"/>
+          </p:nvPr>
+        </p:nvSpPr>
+        <p:spPr/>
+        <p:txBody>
+          <a:bodyPr/>
+          <a:lstStyle/>
+          <a:p>
+            <a:r>
+              <a:rPr lang="en-US" sz="1800" dirty="0">
+                <a:solidFill>
+                  <a:srgbClr val="000000"/>
+                </a:solidFill>
+                <a:effectLst/>
+                <a:latin typeface="Times New Roman" panose="02020603050405020304" pitchFamily="18" charset="0"/>
+                <a:ea typeface="Times New Roman" panose="02020603050405020304" pitchFamily="18" charset="0"/>
+              </a:rPr>
+              <a:t>&lt;apply results, connect results with the chosen problem statement or business question&gt;</a:t>
+            </a:r>
+            <a:endParaRPr lang="en-US" dirty="0"/>
+          </a:p>
+        </p:txBody>
+      </p:sp>
+    </p:spTree>
+    <p:extLst>
+      <p:ext uri="{BB962C8B-B14F-4D97-AF65-F5344CB8AC3E}">
+        <p14:creationId xmlns:p14="http://schemas.microsoft.com/office/powerpoint/2010/main" val="1902738376"/>
+      </p:ext>
+    </p:extLst>
+  </p:cSld>
+  <p:clrMapOvr>
+    <a:masterClrMapping/>
+  </p:clrMapOvr>
+</p:sld>
+</file>
+
+<file path=ppt/slides/slide17.xml><?xml version="1.0" encoding="utf-8"?>
 <p:sld xmlns:a="http://schemas.openxmlformats.org/drawingml/2006/main" xmlns:r="http://schemas.openxmlformats.org/officeDocument/2006/relationships" xmlns:p="http://schemas.openxmlformats.org/presentationml/2006/main">
   <p:cSld>
     <p:spTree>
@@ -4368,11 +5590,12 @@
             </a:r>
           </a:p>
           <a:p>
-            <a:pPr marL="0" indent="0">
+            <a:pPr marL="285750" indent="-285750">
               <a:spcBef>
                 <a:spcPts val="0"/>
               </a:spcBef>
-              <a:buNone/>
+              <a:buFont typeface="Arial" panose="020B0604020202020204" pitchFamily="34" charset="0"/>
+              <a:buChar char="•"/>
             </a:pPr>
             <a:endParaRPr lang="en-US" sz="2000" dirty="0">
               <a:latin typeface="Times New Roman" panose="02020603050405020304" pitchFamily="18" charset="0"/>
@@ -4381,69 +5604,7 @@
           </a:p>
           <a:p>
             <a:pPr marL="0" indent="0">
-              <a:spcBef>
-                <a:spcPts val="0"/>
-              </a:spcBef>
-              <a:buNone/>
-            </a:pPr>
-            <a:endParaRPr lang="en-US" sz="2000" u="sng" dirty="0">
-              <a:latin typeface="Times New Roman" panose="02020603050405020304" pitchFamily="18" charset="0"/>
-              <a:cs typeface="Times New Roman" panose="02020603050405020304" pitchFamily="18" charset="0"/>
-            </a:endParaRPr>
-          </a:p>
-          <a:p>
-            <a:pPr marL="0" indent="0">
-              <a:spcBef>
-                <a:spcPts val="0"/>
-              </a:spcBef>
-              <a:buNone/>
-            </a:pPr>
-            <a:endParaRPr lang="en-US" sz="2000" u="sng" dirty="0">
-              <a:latin typeface="Times New Roman" panose="02020603050405020304" pitchFamily="18" charset="0"/>
-              <a:cs typeface="Times New Roman" panose="02020603050405020304" pitchFamily="18" charset="0"/>
-            </a:endParaRPr>
-          </a:p>
-          <a:p>
-            <a:pPr marL="0" indent="0">
-              <a:spcBef>
-                <a:spcPts val="0"/>
-              </a:spcBef>
-              <a:buNone/>
-            </a:pPr>
-            <a:endParaRPr lang="en-US" sz="2000" u="sng" dirty="0">
-              <a:latin typeface="Times New Roman" panose="02020603050405020304" pitchFamily="18" charset="0"/>
-              <a:cs typeface="Times New Roman" panose="02020603050405020304" pitchFamily="18" charset="0"/>
-            </a:endParaRPr>
-          </a:p>
-          <a:p>
-            <a:pPr marL="0" indent="0">
-              <a:spcBef>
-                <a:spcPts val="0"/>
-              </a:spcBef>
-              <a:buNone/>
-            </a:pPr>
-            <a:endParaRPr lang="en-US" sz="2000" u="sng" dirty="0">
-              <a:latin typeface="Times New Roman" panose="02020603050405020304" pitchFamily="18" charset="0"/>
-              <a:cs typeface="Times New Roman" panose="02020603050405020304" pitchFamily="18" charset="0"/>
-            </a:endParaRPr>
-          </a:p>
-          <a:p>
-            <a:pPr marL="0" indent="0">
-              <a:spcBef>
-                <a:spcPts val="0"/>
-              </a:spcBef>
-              <a:buNone/>
-            </a:pPr>
-            <a:endParaRPr lang="en-US" sz="2000" u="sng" dirty="0">
-              <a:latin typeface="Times New Roman" panose="02020603050405020304" pitchFamily="18" charset="0"/>
-              <a:cs typeface="Times New Roman" panose="02020603050405020304" pitchFamily="18" charset="0"/>
-            </a:endParaRPr>
-          </a:p>
-          <a:p>
-            <a:pPr marL="0" indent="0">
-              <a:spcBef>
-                <a:spcPts val="0"/>
-              </a:spcBef>
+              <a:buFont typeface="Arial" panose="020B0604020202020204" pitchFamily="34" charset="0"/>
               <a:buNone/>
             </a:pPr>
             <a:r>
@@ -4451,7 +5612,7 @@
                 <a:latin typeface="Times New Roman" panose="02020603050405020304" pitchFamily="18" charset="0"/>
                 <a:cs typeface="Times New Roman" panose="02020603050405020304" pitchFamily="18" charset="0"/>
               </a:rPr>
-              <a:t>Social</a:t>
+              <a:t>Socioeconomic</a:t>
             </a:r>
           </a:p>
           <a:p>
@@ -4467,7 +5628,58 @@
                 <a:latin typeface="Times New Roman" panose="02020603050405020304" pitchFamily="18" charset="0"/>
                 <a:cs typeface="Times New Roman" panose="02020603050405020304" pitchFamily="18" charset="0"/>
               </a:rPr>
-              <a:t>Educational attainment</a:t>
+              <a:t>Household income</a:t>
+            </a:r>
+          </a:p>
+          <a:p>
+            <a:pPr marL="0" indent="0">
+              <a:spcBef>
+                <a:spcPts val="0"/>
+              </a:spcBef>
+              <a:buNone/>
+            </a:pPr>
+            <a:endParaRPr lang="en-US" sz="2000" dirty="0">
+              <a:latin typeface="Times New Roman" panose="02020603050405020304" pitchFamily="18" charset="0"/>
+              <a:cs typeface="Times New Roman" panose="02020603050405020304" pitchFamily="18" charset="0"/>
+            </a:endParaRPr>
+          </a:p>
+          <a:p>
+            <a:pPr marL="0" indent="0">
+              <a:spcBef>
+                <a:spcPts val="0"/>
+              </a:spcBef>
+              <a:buNone/>
+            </a:pPr>
+            <a:endParaRPr lang="en-US" sz="2000" u="sng" dirty="0">
+              <a:latin typeface="Times New Roman" panose="02020603050405020304" pitchFamily="18" charset="0"/>
+              <a:cs typeface="Times New Roman" panose="02020603050405020304" pitchFamily="18" charset="0"/>
+            </a:endParaRPr>
+          </a:p>
+          <a:p>
+            <a:pPr marL="0" indent="0">
+              <a:spcBef>
+                <a:spcPts val="0"/>
+              </a:spcBef>
+              <a:buNone/>
+            </a:pPr>
+            <a:endParaRPr lang="en-US" sz="2000" u="sng" dirty="0">
+              <a:latin typeface="Times New Roman" panose="02020603050405020304" pitchFamily="18" charset="0"/>
+              <a:cs typeface="Times New Roman" panose="02020603050405020304" pitchFamily="18" charset="0"/>
+            </a:endParaRPr>
+          </a:p>
+          <a:p>
+            <a:pPr marL="0" indent="0">
+              <a:spcBef>
+                <a:spcPts val="0"/>
+              </a:spcBef>
+              <a:buNone/>
+            </a:pPr>
+            <a:r>
+              <a:rPr lang="en-US" sz="2000" u="sng" dirty="0">
+                <a:latin typeface="Times New Roman" panose="02020603050405020304" pitchFamily="18" charset="0"/>
+                <a:cs typeface="Times New Roman" panose="02020603050405020304" pitchFamily="18" charset="0"/>
+              </a:rPr>
+              <a:t>Social</a:t>
             </a:r>
           </a:p>
           <a:p>
@@ -4483,7 +5695,7 @@
                 <a:latin typeface="Times New Roman" panose="02020603050405020304" pitchFamily="18" charset="0"/>
                 <a:cs typeface="Times New Roman" panose="02020603050405020304" pitchFamily="18" charset="0"/>
               </a:rPr>
-              <a:t>Marital Status</a:t>
+              <a:t>Educational attainment</a:t>
             </a:r>
           </a:p>
           <a:p>
@@ -4499,7 +5711,7 @@
                 <a:latin typeface="Times New Roman" panose="02020603050405020304" pitchFamily="18" charset="0"/>
                 <a:cs typeface="Times New Roman" panose="02020603050405020304" pitchFamily="18" charset="0"/>
               </a:rPr>
-              <a:t>Active duty veteran</a:t>
+              <a:t>Marital Status</a:t>
             </a:r>
           </a:p>
           <a:p>
@@ -4515,31 +5727,7 @@
                 <a:latin typeface="Times New Roman" panose="02020603050405020304" pitchFamily="18" charset="0"/>
                 <a:cs typeface="Times New Roman" panose="02020603050405020304" pitchFamily="18" charset="0"/>
               </a:rPr>
-              <a:t>Feelings of social isolation</a:t>
-            </a:r>
-          </a:p>
-          <a:p>
-            <a:pPr>
-              <a:spcBef>
-                <a:spcPts val="0"/>
-              </a:spcBef>
-            </a:pPr>
-            <a:endParaRPr lang="en-US" sz="2000" dirty="0">
-              <a:latin typeface="Times New Roman" panose="02020603050405020304" pitchFamily="18" charset="0"/>
-              <a:cs typeface="Times New Roman" panose="02020603050405020304" pitchFamily="18" charset="0"/>
-            </a:endParaRPr>
-          </a:p>
-          <a:p>
-            <a:pPr marL="0" indent="0">
-              <a:buFont typeface="Arial" panose="020B0604020202020204" pitchFamily="34" charset="0"/>
-              <a:buNone/>
-            </a:pPr>
-            <a:r>
-              <a:rPr lang="en-US" sz="2000" u="sng" dirty="0">
-                <a:latin typeface="Times New Roman" panose="02020603050405020304" pitchFamily="18" charset="0"/>
-                <a:cs typeface="Times New Roman" panose="02020603050405020304" pitchFamily="18" charset="0"/>
-              </a:rPr>
-              <a:t>Socioeconomic</a:t>
+              <a:t>Active duty veteran</a:t>
             </a:r>
           </a:p>
           <a:p>
@@ -4555,8 +5743,19 @@
                 <a:latin typeface="Times New Roman" panose="02020603050405020304" pitchFamily="18" charset="0"/>
                 <a:cs typeface="Times New Roman" panose="02020603050405020304" pitchFamily="18" charset="0"/>
               </a:rPr>
-              <a:t>Household income</a:t>
-            </a:r>
+              <a:t>Feelings of social isolation</a:t>
+            </a:r>
+          </a:p>
+          <a:p>
+            <a:pPr>
+              <a:spcBef>
+                <a:spcPts val="0"/>
+              </a:spcBef>
+            </a:pPr>
+            <a:endParaRPr lang="en-US" sz="2000" dirty="0">
+              <a:latin typeface="Times New Roman" panose="02020603050405020304" pitchFamily="18" charset="0"/>
+              <a:cs typeface="Times New Roman" panose="02020603050405020304" pitchFamily="18" charset="0"/>
+            </a:endParaRPr>
           </a:p>
         </p:txBody>
       </p:sp>
@@ -4691,7 +5890,7 @@
         <p:spPr>
           <a:xfrm>
             <a:off x="838200" y="2353469"/>
-            <a:ext cx="11008426" cy="3785652"/>
+            <a:ext cx="3045031" cy="3785652"/>
           </a:xfrm>
           <a:prstGeom prst="rect">
             <a:avLst/>
@@ -4699,7 +5898,7 @@
           <a:noFill/>
         </p:spPr>
         <p:txBody>
-          <a:bodyPr wrap="square" numCol="2" rtlCol="0">
+          <a:bodyPr wrap="square" numCol="1" rtlCol="0">
             <a:spAutoFit/>
           </a:bodyPr>
           <a:lstStyle/>
@@ -4886,6 +6085,35 @@
               <a:t>Past-month exercise</a:t>
             </a:r>
           </a:p>
+        </p:txBody>
+      </p:sp>
+      <p:sp>
+        <p:nvSpPr>
+          <p:cNvPr id="5" name="TextBox 4">
+            <a:extLst>
+              <a:ext uri="{FF2B5EF4-FFF2-40B4-BE49-F238E27FC236}">
+                <a16:creationId xmlns:a16="http://schemas.microsoft.com/office/drawing/2014/main" id="{E52D9F33-EE40-565C-0D8A-7206EE8ED4E9}"/>
+              </a:ext>
+            </a:extLst>
+          </p:cNvPr>
+          <p:cNvSpPr txBox="1"/>
+          <p:nvPr/>
+        </p:nvSpPr>
+        <p:spPr>
+          <a:xfrm>
+            <a:off x="5118264" y="2353469"/>
+            <a:ext cx="5605154" cy="2246769"/>
+          </a:xfrm>
+          <a:prstGeom prst="rect">
+            <a:avLst/>
+          </a:prstGeom>
+          <a:noFill/>
+        </p:spPr>
+        <p:txBody>
+          <a:bodyPr wrap="square">
+            <a:spAutoFit/>
+          </a:bodyPr>
+          <a:lstStyle/>
           <a:p>
             <a:pPr marL="0" marR="0" lvl="0" indent="0" algn="l" defTabSz="914400" rtl="0" eaLnBrk="1" fontAlgn="auto" latinLnBrk="0" hangingPunct="1">
               <a:lnSpc>
@@ -5092,17 +6320,6 @@
               <a:uFillTx/>
               <a:latin typeface="Times New Roman" panose="02020603050405020304" pitchFamily="18" charset="0"/>
               <a:ea typeface="+mn-ea"/>
-              <a:cs typeface="Times New Roman" panose="02020603050405020304" pitchFamily="18" charset="0"/>
-            </a:endParaRPr>
-          </a:p>
-          <a:p>
-            <a:pPr>
-              <a:spcBef>
-                <a:spcPts val="0"/>
-              </a:spcBef>
-            </a:pPr>
-            <a:endParaRPr lang="en-US" sz="2000" dirty="0">
-              <a:latin typeface="Times New Roman" panose="02020603050405020304" pitchFamily="18" charset="0"/>
               <a:cs typeface="Times New Roman" panose="02020603050405020304" pitchFamily="18" charset="0"/>
             </a:endParaRPr>
           </a:p>
@@ -5184,8 +6401,8 @@
         </p:nvSpPr>
         <p:spPr>
           <a:xfrm>
-            <a:off x="838200" y="1825625"/>
-            <a:ext cx="4488809" cy="3887277"/>
+            <a:off x="838200" y="1690688"/>
+            <a:ext cx="4488809" cy="4551424"/>
           </a:xfrm>
         </p:spPr>
         <p:txBody>
@@ -5217,6 +6434,34 @@
                 <a:ea typeface="Times New Roman" panose="02020603050405020304" pitchFamily="18" charset="0"/>
               </a:rPr>
               <a:t>Missing values were replaced utilizing mode imputation for categorical values and mean imputation for continuous variables.</a:t>
+            </a:r>
+          </a:p>
+          <a:p>
+            <a:pPr lvl="1"/>
+            <a:r>
+              <a:rPr lang="en-US" sz="1600" dirty="0">
+                <a:solidFill>
+                  <a:srgbClr val="000000"/>
+                </a:solidFill>
+                <a:effectLst/>
+                <a:latin typeface="Times New Roman" panose="02020603050405020304" pitchFamily="18" charset="0"/>
+                <a:ea typeface="Times New Roman" panose="02020603050405020304" pitchFamily="18" charset="0"/>
+              </a:rPr>
+              <a:t>This maintains data integrity while ensuring consistent analysis.</a:t>
+            </a:r>
+          </a:p>
+          <a:p>
+            <a:pPr lvl="1"/>
+            <a:r>
+              <a:rPr lang="en-US" sz="1600" dirty="0">
+                <a:solidFill>
+                  <a:srgbClr val="000000"/>
+                </a:solidFill>
+                <a:effectLst/>
+                <a:latin typeface="Times New Roman" panose="02020603050405020304" pitchFamily="18" charset="0"/>
+                <a:ea typeface="Times New Roman" panose="02020603050405020304" pitchFamily="18" charset="0"/>
+              </a:rPr>
+              <a:t>Minimizes the impact of missing data on the results.</a:t>
             </a:r>
           </a:p>
           <a:p>
@@ -5328,8 +6573,12 @@
           <a:lstStyle/>
           <a:p>
             <a:r>
+              <a:rPr lang="en-US" b="1" dirty="0"/>
+              <a:t>Analyze data: </a:t>
+            </a:r>
+            <a:r>
               <a:rPr lang="en-US" dirty="0"/>
-              <a:t>Analyze data</a:t>
+              <a:t>Age &amp; Sex</a:t>
             </a:r>
           </a:p>
         </p:txBody>
@@ -5437,10 +6686,10 @@
       </p:sp>
       <p:pic>
         <p:nvPicPr>
-          <p:cNvPr id="5" name="Picture 4">
-            <a:extLst>
-              <a:ext uri="{FF2B5EF4-FFF2-40B4-BE49-F238E27FC236}">
-                <a16:creationId xmlns:a16="http://schemas.microsoft.com/office/drawing/2014/main" id="{E8192F76-182B-4568-A3B0-BDD9404ABAEA}"/>
+          <p:cNvPr id="6" name="Picture 5">
+            <a:extLst>
+              <a:ext uri="{FF2B5EF4-FFF2-40B4-BE49-F238E27FC236}">
+                <a16:creationId xmlns:a16="http://schemas.microsoft.com/office/drawing/2014/main" id="{2CB2818B-3AB3-6D80-6867-07D5A37225B4}"/>
               </a:ext>
             </a:extLst>
           </p:cNvPr>
@@ -5457,8 +6706,8 @@
         </p:blipFill>
         <p:spPr>
           <a:xfrm>
-            <a:off x="5529918" y="1586985"/>
-            <a:ext cx="5437935" cy="4096107"/>
+            <a:off x="5135935" y="1690688"/>
+            <a:ext cx="5601482" cy="4363059"/>
           </a:xfrm>
           <a:prstGeom prst="rect">
             <a:avLst/>
@@ -5560,7 +6809,7 @@
                 <a:latin typeface="Times New Roman" panose="02020603050405020304" pitchFamily="18" charset="0"/>
                 <a:ea typeface="Times New Roman" panose="02020603050405020304" pitchFamily="18" charset="0"/>
               </a:rPr>
-              <a:t>Several variables are positively correlated with worsening memory and/or confusion (ADDEPEV3). </a:t>
+              <a:t>Several variables are positively correlated with worsening memory and/or confusion (CIMEMLOS). </a:t>
             </a:r>
           </a:p>
         </p:txBody>
@@ -5758,10 +7007,10 @@
       </p:sp>
       <p:pic>
         <p:nvPicPr>
-          <p:cNvPr id="8" name="Picture 7">
-            <a:extLst>
-              <a:ext uri="{FF2B5EF4-FFF2-40B4-BE49-F238E27FC236}">
-                <a16:creationId xmlns:a16="http://schemas.microsoft.com/office/drawing/2014/main" id="{F572812F-1B00-00D9-479A-325061E3BAC8}"/>
+          <p:cNvPr id="5" name="Picture 4">
+            <a:extLst>
+              <a:ext uri="{FF2B5EF4-FFF2-40B4-BE49-F238E27FC236}">
+                <a16:creationId xmlns:a16="http://schemas.microsoft.com/office/drawing/2014/main" id="{BE9BB622-F332-4DB3-A854-0DAC1700C0CE}"/>
               </a:ext>
             </a:extLst>
           </p:cNvPr>
@@ -5778,8 +7027,8 @@
         </p:blipFill>
         <p:spPr>
           <a:xfrm>
-            <a:off x="928811" y="2822673"/>
-            <a:ext cx="4084715" cy="3338614"/>
+            <a:off x="674053" y="2822673"/>
+            <a:ext cx="4231130" cy="3618345"/>
           </a:xfrm>
           <a:prstGeom prst="rect">
             <a:avLst/>
@@ -5832,7 +7081,12 @@
             <p:ph type="title"/>
           </p:nvPr>
         </p:nvSpPr>
-        <p:spPr/>
+        <p:spPr>
+          <a:xfrm>
+            <a:off x="731322" y="178644"/>
+            <a:ext cx="10515600" cy="1325563"/>
+          </a:xfrm>
+        </p:spPr>
         <p:txBody>
           <a:bodyPr/>
           <a:lstStyle/>
@@ -5862,8 +7116,8 @@
         </p:nvSpPr>
         <p:spPr>
           <a:xfrm>
-            <a:off x="838200" y="1610686"/>
-            <a:ext cx="9699433" cy="1500650"/>
+            <a:off x="731322" y="1460665"/>
+            <a:ext cx="9699433" cy="2854436"/>
           </a:xfrm>
         </p:spPr>
         <p:txBody>
@@ -5893,8 +7147,100 @@
                 <a:latin typeface="Times New Roman" panose="02020603050405020304" pitchFamily="18" charset="0"/>
                 <a:ea typeface="Times New Roman" panose="02020603050405020304" pitchFamily="18" charset="0"/>
               </a:rPr>
-              <a:t>Some predictors appear less correlated in older age groups.</a:t>
-            </a:r>
+              <a:t>Several predictors appear to have a greater bearing on memory problems and confusion in younger respondents compared with older respondents, including: </a:t>
+            </a:r>
+            <a:endParaRPr lang="en-US" sz="2000" dirty="0">
+              <a:solidFill>
+                <a:srgbClr val="000000"/>
+              </a:solidFill>
+              <a:latin typeface="Times New Roman" panose="02020603050405020304" pitchFamily="18" charset="0"/>
+              <a:ea typeface="Times New Roman" panose="02020603050405020304" pitchFamily="18" charset="0"/>
+            </a:endParaRPr>
+          </a:p>
+          <a:p>
+            <a:pPr lvl="1"/>
+            <a:r>
+              <a:rPr lang="en-US" sz="1600" dirty="0">
+                <a:solidFill>
+                  <a:srgbClr val="000000"/>
+                </a:solidFill>
+                <a:effectLst/>
+                <a:latin typeface="Times New Roman" panose="02020603050405020304" pitchFamily="18" charset="0"/>
+                <a:ea typeface="Times New Roman" panose="02020603050405020304" pitchFamily="18" charset="0"/>
+              </a:rPr>
+              <a:t>Respondent gender</a:t>
+            </a:r>
+          </a:p>
+          <a:p>
+            <a:pPr lvl="1"/>
+            <a:r>
+              <a:rPr lang="en-US" sz="1600" dirty="0">
+                <a:solidFill>
+                  <a:srgbClr val="000000"/>
+                </a:solidFill>
+                <a:effectLst/>
+                <a:latin typeface="Times New Roman" panose="02020603050405020304" pitchFamily="18" charset="0"/>
+                <a:ea typeface="Times New Roman" panose="02020603050405020304" pitchFamily="18" charset="0"/>
+              </a:rPr>
+              <a:t>Overall physical health</a:t>
+            </a:r>
+          </a:p>
+          <a:p>
+            <a:pPr lvl="1"/>
+            <a:r>
+              <a:rPr lang="en-US" sz="1600" dirty="0">
+                <a:solidFill>
+                  <a:srgbClr val="000000"/>
+                </a:solidFill>
+                <a:latin typeface="Times New Roman" panose="02020603050405020304" pitchFamily="18" charset="0"/>
+                <a:ea typeface="Times New Roman" panose="02020603050405020304" pitchFamily="18" charset="0"/>
+              </a:rPr>
+              <a:t>Overall </a:t>
+            </a:r>
+            <a:r>
+              <a:rPr lang="en-US" sz="1600" dirty="0">
+                <a:solidFill>
+                  <a:srgbClr val="000000"/>
+                </a:solidFill>
+                <a:effectLst/>
+                <a:latin typeface="Times New Roman" panose="02020603050405020304" pitchFamily="18" charset="0"/>
+                <a:ea typeface="Times New Roman" panose="02020603050405020304" pitchFamily="18" charset="0"/>
+              </a:rPr>
+              <a:t>mental health</a:t>
+            </a:r>
+          </a:p>
+          <a:p>
+            <a:pPr lvl="1"/>
+            <a:r>
+              <a:rPr lang="en-US" sz="1600" dirty="0">
+                <a:solidFill>
+                  <a:srgbClr val="000000"/>
+                </a:solidFill>
+                <a:effectLst/>
+                <a:latin typeface="Times New Roman" panose="02020603050405020304" pitchFamily="18" charset="0"/>
+                <a:ea typeface="Times New Roman" panose="02020603050405020304" pitchFamily="18" charset="0"/>
+              </a:rPr>
+              <a:t>Adverse childhood experiences</a:t>
+            </a:r>
+            <a:endParaRPr lang="en-US" sz="2000" dirty="0">
+              <a:solidFill>
+                <a:srgbClr val="000000"/>
+              </a:solidFill>
+              <a:effectLst/>
+              <a:latin typeface="Times New Roman" panose="02020603050405020304" pitchFamily="18" charset="0"/>
+              <a:ea typeface="Times New Roman" panose="02020603050405020304" pitchFamily="18" charset="0"/>
+            </a:endParaRPr>
+          </a:p>
+          <a:p>
+            <a:pPr lvl="1"/>
+            <a:endParaRPr lang="en-US" sz="1600" dirty="0">
+              <a:solidFill>
+                <a:srgbClr val="000000"/>
+              </a:solidFill>
+              <a:effectLst/>
+              <a:latin typeface="Times New Roman" panose="02020603050405020304" pitchFamily="18" charset="0"/>
+              <a:ea typeface="Times New Roman" panose="02020603050405020304" pitchFamily="18" charset="0"/>
+            </a:endParaRPr>
           </a:p>
         </p:txBody>
       </p:sp>
@@ -5920,8 +7266,38 @@
         </p:blipFill>
         <p:spPr>
           <a:xfrm>
-            <a:off x="1739252" y="2936249"/>
-            <a:ext cx="7897327" cy="3439005"/>
+            <a:off x="220683" y="4085077"/>
+            <a:ext cx="5611145" cy="2443454"/>
+          </a:xfrm>
+          <a:prstGeom prst="rect">
+            <a:avLst/>
+          </a:prstGeom>
+        </p:spPr>
+      </p:pic>
+      <p:pic>
+        <p:nvPicPr>
+          <p:cNvPr id="6" name="Picture 5">
+            <a:extLst>
+              <a:ext uri="{FF2B5EF4-FFF2-40B4-BE49-F238E27FC236}">
+                <a16:creationId xmlns:a16="http://schemas.microsoft.com/office/drawing/2014/main" id="{259E7B1F-2C37-6780-2DC6-2607B4F30F92}"/>
+              </a:ext>
+            </a:extLst>
+          </p:cNvPr>
+          <p:cNvPicPr>
+            <a:picLocks noChangeAspect="1"/>
+          </p:cNvPicPr>
+          <p:nvPr/>
+        </p:nvPicPr>
+        <p:blipFill>
+          <a:blip r:embed="rId3"/>
+          <a:stretch>
+            <a:fillRect/>
+          </a:stretch>
+        </p:blipFill>
+        <p:spPr>
+          <a:xfrm>
+            <a:off x="5687916" y="4085077"/>
+            <a:ext cx="5932537" cy="2579364"/>
           </a:xfrm>
           <a:prstGeom prst="rect">
             <a:avLst/>

</xml_diff>